<commit_message>
^ Change some pages
</commit_message>
<xml_diff>
--- a/ppt/毕设答辩_于泽汉.pptx
+++ b/ppt/毕设答辩_于泽汉.pptx
@@ -1138,13 +1138,13 @@
     </dgm:pt>
   </dgm:ptLst>
   <dgm:cxnLst>
+    <dgm:cxn modelId="{65D57248-782E-4161-BE5D-96AB61F86065}" type="presOf" srcId="{9C2A3003-AB80-450D-8AE1-EA4DE55AECAD}" destId="{2D7EC5F2-B4D5-4475-80CA-5AA5D8AF6008}" srcOrd="0" destOrd="0" presId="urn:microsoft.com/office/officeart/2005/8/layout/chevron1"/>
+    <dgm:cxn modelId="{0092C74C-D9A7-43E0-AFE8-972DFA9AC99B}" type="presOf" srcId="{58987C2E-EF18-455C-BB7F-86D7E3AF358F}" destId="{64A7C0C1-4AB3-4C7B-BAD0-73FD2A97C9EF}" srcOrd="0" destOrd="0" presId="urn:microsoft.com/office/officeart/2005/8/layout/chevron1"/>
     <dgm:cxn modelId="{0AB98673-A437-4A53-B7B3-A77DA736FBF3}" srcId="{2175330C-7690-4DA7-A695-175541358A94}" destId="{9C2A3003-AB80-450D-8AE1-EA4DE55AECAD}" srcOrd="1" destOrd="0" parTransId="{CB6ED890-8D02-4F29-806A-4FC7856A002D}" sibTransId="{A702744C-585B-4335-A59A-B12F08BE35A6}"/>
+    <dgm:cxn modelId="{C5238DBD-D694-4A96-9AEE-000C00241313}" srcId="{2175330C-7690-4DA7-A695-175541358A94}" destId="{DF25EB7A-D1A1-4A71-9E81-D7C931D019AB}" srcOrd="2" destOrd="0" parTransId="{A9E8E488-7F8C-4A50-9860-8DEE049866F9}" sibTransId="{372C0A95-8D91-4826-81A6-3731275C32BE}"/>
+    <dgm:cxn modelId="{731B8EA2-F347-4916-8329-649D754B107C}" srcId="{2175330C-7690-4DA7-A695-175541358A94}" destId="{58987C2E-EF18-455C-BB7F-86D7E3AF358F}" srcOrd="0" destOrd="0" parTransId="{9B26BA0B-0A13-4972-A4AD-5C1E30A3A88F}" sibTransId="{5367824A-5B67-4587-AE24-5690201D1AE6}"/>
     <dgm:cxn modelId="{B0141CB0-5303-4A4D-87AE-E673C5268130}" type="presOf" srcId="{DF25EB7A-D1A1-4A71-9E81-D7C931D019AB}" destId="{57E8909A-2378-414C-958C-8B073756ADC2}" srcOrd="0" destOrd="0" presId="urn:microsoft.com/office/officeart/2005/8/layout/chevron1"/>
-    <dgm:cxn modelId="{0092C74C-D9A7-43E0-AFE8-972DFA9AC99B}" type="presOf" srcId="{58987C2E-EF18-455C-BB7F-86D7E3AF358F}" destId="{64A7C0C1-4AB3-4C7B-BAD0-73FD2A97C9EF}" srcOrd="0" destOrd="0" presId="urn:microsoft.com/office/officeart/2005/8/layout/chevron1"/>
-    <dgm:cxn modelId="{C5238DBD-D694-4A96-9AEE-000C00241313}" srcId="{2175330C-7690-4DA7-A695-175541358A94}" destId="{DF25EB7A-D1A1-4A71-9E81-D7C931D019AB}" srcOrd="2" destOrd="0" parTransId="{A9E8E488-7F8C-4A50-9860-8DEE049866F9}" sibTransId="{372C0A95-8D91-4826-81A6-3731275C32BE}"/>
-    <dgm:cxn modelId="{65D57248-782E-4161-BE5D-96AB61F86065}" type="presOf" srcId="{9C2A3003-AB80-450D-8AE1-EA4DE55AECAD}" destId="{2D7EC5F2-B4D5-4475-80CA-5AA5D8AF6008}" srcOrd="0" destOrd="0" presId="urn:microsoft.com/office/officeart/2005/8/layout/chevron1"/>
     <dgm:cxn modelId="{0A2FE3DD-F2F5-45A2-8AA0-28444EC87EDA}" type="presOf" srcId="{2175330C-7690-4DA7-A695-175541358A94}" destId="{431D4A55-AAD7-47E3-AC06-E4DF3BAC1345}" srcOrd="0" destOrd="0" presId="urn:microsoft.com/office/officeart/2005/8/layout/chevron1"/>
-    <dgm:cxn modelId="{731B8EA2-F347-4916-8329-649D754B107C}" srcId="{2175330C-7690-4DA7-A695-175541358A94}" destId="{58987C2E-EF18-455C-BB7F-86D7E3AF358F}" srcOrd="0" destOrd="0" parTransId="{9B26BA0B-0A13-4972-A4AD-5C1E30A3A88F}" sibTransId="{5367824A-5B67-4587-AE24-5690201D1AE6}"/>
     <dgm:cxn modelId="{3EB11F0C-A940-4DEE-B6EF-929D066FE82F}" type="presParOf" srcId="{431D4A55-AAD7-47E3-AC06-E4DF3BAC1345}" destId="{64A7C0C1-4AB3-4C7B-BAD0-73FD2A97C9EF}" srcOrd="0" destOrd="0" presId="urn:microsoft.com/office/officeart/2005/8/layout/chevron1"/>
     <dgm:cxn modelId="{5052D157-75F1-4202-9399-B64ED74E72BE}" type="presParOf" srcId="{431D4A55-AAD7-47E3-AC06-E4DF3BAC1345}" destId="{F7EFD8E2-7167-4A13-9989-95248F4FC683}" srcOrd="1" destOrd="0" presId="urn:microsoft.com/office/officeart/2005/8/layout/chevron1"/>
     <dgm:cxn modelId="{A7DF139D-26F9-4AF1-B6AE-9368CC6EC218}" type="presParOf" srcId="{431D4A55-AAD7-47E3-AC06-E4DF3BAC1345}" destId="{2D7EC5F2-B4D5-4475-80CA-5AA5D8AF6008}" srcOrd="2" destOrd="0" presId="urn:microsoft.com/office/officeart/2005/8/layout/chevron1"/>
@@ -2892,7 +2892,7 @@
           <a:p>
             <a:fld id="{202C1FBA-CF23-45CA-A289-03E32D160964}" type="datetimeFigureOut">
               <a:rPr lang="zh-CN" altLang="en-US" smtClean="0"/>
-              <a:t>2018/6/13</a:t>
+              <a:t>2018/6/14</a:t>
             </a:fld>
             <a:endParaRPr lang="zh-CN" altLang="en-US"/>
           </a:p>
@@ -3057,7 +3057,7 @@
           <a:p>
             <a:fld id="{6D966BD8-0FC1-456F-BDC6-7D0CA8E36566}" type="datetimeFigureOut">
               <a:rPr lang="zh-CN" altLang="en-US" smtClean="0"/>
-              <a:t>2018/6/13</a:t>
+              <a:t>2018/6/14</a:t>
             </a:fld>
             <a:endParaRPr lang="zh-CN" altLang="en-US"/>
           </a:p>
@@ -14768,7 +14768,7 @@
         </p:blipFill>
         <p:spPr>
           <a:xfrm>
-            <a:off x="1749972" y="3196754"/>
+            <a:off x="1758439" y="3196754"/>
             <a:ext cx="5186856" cy="3439268"/>
           </a:xfrm>
           <a:prstGeom prst="rect">
@@ -14798,7 +14798,7 @@
         </p:blipFill>
         <p:spPr>
           <a:xfrm>
-            <a:off x="1805152" y="2632012"/>
+            <a:off x="1813035" y="2632012"/>
             <a:ext cx="4769068" cy="1687739"/>
           </a:xfrm>
           <a:prstGeom prst="rect">
@@ -14837,6 +14837,812 @@
           </a:p>
         </p:txBody>
       </p:sp>
+      <p:sp>
+        <p:nvSpPr>
+          <p:cNvPr id="2" name="椭圆 1"/>
+          <p:cNvSpPr/>
+          <p:nvPr/>
+        </p:nvSpPr>
+        <p:spPr>
+          <a:xfrm>
+            <a:off x="3090041" y="2987149"/>
+            <a:ext cx="811925" cy="465083"/>
+          </a:xfrm>
+          <a:prstGeom prst="ellipse">
+            <a:avLst/>
+          </a:prstGeom>
+          <a:noFill/>
+          <a:ln>
+            <a:solidFill>
+              <a:srgbClr val="FF0000"/>
+            </a:solidFill>
+          </a:ln>
+        </p:spPr>
+        <p:style>
+          <a:lnRef idx="2">
+            <a:schemeClr val="accent1">
+              <a:shade val="50000"/>
+            </a:schemeClr>
+          </a:lnRef>
+          <a:fillRef idx="1">
+            <a:schemeClr val="accent1"/>
+          </a:fillRef>
+          <a:effectRef idx="0">
+            <a:schemeClr val="accent1"/>
+          </a:effectRef>
+          <a:fontRef idx="minor">
+            <a:schemeClr val="lt1"/>
+          </a:fontRef>
+        </p:style>
+        <p:txBody>
+          <a:bodyPr rtlCol="0" anchor="ctr"/>
+          <a:lstStyle/>
+          <a:p>
+            <a:pPr algn="ctr"/>
+            <a:endParaRPr lang="zh-CN" altLang="en-US"/>
+          </a:p>
+        </p:txBody>
+      </p:sp>
+      <p:sp>
+        <p:nvSpPr>
+          <p:cNvPr id="7" name="椭圆 6"/>
+          <p:cNvSpPr/>
+          <p:nvPr/>
+        </p:nvSpPr>
+        <p:spPr>
+          <a:xfrm>
+            <a:off x="2104110" y="2964212"/>
+            <a:ext cx="575442" cy="465083"/>
+          </a:xfrm>
+          <a:prstGeom prst="ellipse">
+            <a:avLst/>
+          </a:prstGeom>
+          <a:noFill/>
+          <a:ln>
+            <a:solidFill>
+              <a:srgbClr val="FF0000"/>
+            </a:solidFill>
+          </a:ln>
+        </p:spPr>
+        <p:style>
+          <a:lnRef idx="2">
+            <a:schemeClr val="accent1">
+              <a:shade val="50000"/>
+            </a:schemeClr>
+          </a:lnRef>
+          <a:fillRef idx="1">
+            <a:schemeClr val="accent1"/>
+          </a:fillRef>
+          <a:effectRef idx="0">
+            <a:schemeClr val="accent1"/>
+          </a:effectRef>
+          <a:fontRef idx="minor">
+            <a:schemeClr val="lt1"/>
+          </a:fontRef>
+        </p:style>
+        <p:txBody>
+          <a:bodyPr rtlCol="0" anchor="ctr"/>
+          <a:lstStyle/>
+          <a:p>
+            <a:pPr algn="ctr"/>
+            <a:endParaRPr lang="zh-CN" altLang="en-US"/>
+          </a:p>
+        </p:txBody>
+      </p:sp>
+      <p:sp>
+        <p:nvSpPr>
+          <p:cNvPr id="8" name="椭圆 7"/>
+          <p:cNvSpPr/>
+          <p:nvPr/>
+        </p:nvSpPr>
+        <p:spPr>
+          <a:xfrm>
+            <a:off x="4366108" y="2978850"/>
+            <a:ext cx="663096" cy="473382"/>
+          </a:xfrm>
+          <a:prstGeom prst="ellipse">
+            <a:avLst/>
+          </a:prstGeom>
+          <a:noFill/>
+          <a:ln>
+            <a:solidFill>
+              <a:srgbClr val="FF0000"/>
+            </a:solidFill>
+          </a:ln>
+        </p:spPr>
+        <p:style>
+          <a:lnRef idx="2">
+            <a:schemeClr val="accent1">
+              <a:shade val="50000"/>
+            </a:schemeClr>
+          </a:lnRef>
+          <a:fillRef idx="1">
+            <a:schemeClr val="accent1"/>
+          </a:fillRef>
+          <a:effectRef idx="0">
+            <a:schemeClr val="accent1"/>
+          </a:effectRef>
+          <a:fontRef idx="minor">
+            <a:schemeClr val="lt1"/>
+          </a:fontRef>
+        </p:style>
+        <p:txBody>
+          <a:bodyPr rtlCol="0" anchor="ctr"/>
+          <a:lstStyle/>
+          <a:p>
+            <a:pPr algn="ctr"/>
+            <a:endParaRPr lang="zh-CN" altLang="en-US"/>
+          </a:p>
+        </p:txBody>
+      </p:sp>
+      <p:sp>
+        <p:nvSpPr>
+          <p:cNvPr id="9" name="椭圆 8"/>
+          <p:cNvSpPr/>
+          <p:nvPr/>
+        </p:nvSpPr>
+        <p:spPr>
+          <a:xfrm>
+            <a:off x="5631661" y="2987149"/>
+            <a:ext cx="611484" cy="465083"/>
+          </a:xfrm>
+          <a:prstGeom prst="ellipse">
+            <a:avLst/>
+          </a:prstGeom>
+          <a:noFill/>
+          <a:ln>
+            <a:solidFill>
+              <a:srgbClr val="FF0000"/>
+            </a:solidFill>
+          </a:ln>
+        </p:spPr>
+        <p:style>
+          <a:lnRef idx="2">
+            <a:schemeClr val="accent1">
+              <a:shade val="50000"/>
+            </a:schemeClr>
+          </a:lnRef>
+          <a:fillRef idx="1">
+            <a:schemeClr val="accent1"/>
+          </a:fillRef>
+          <a:effectRef idx="0">
+            <a:schemeClr val="accent1"/>
+          </a:effectRef>
+          <a:fontRef idx="minor">
+            <a:schemeClr val="lt1"/>
+          </a:fontRef>
+        </p:style>
+        <p:txBody>
+          <a:bodyPr rtlCol="0" anchor="ctr"/>
+          <a:lstStyle/>
+          <a:p>
+            <a:pPr algn="ctr"/>
+            <a:endParaRPr lang="zh-CN" altLang="en-US"/>
+          </a:p>
+        </p:txBody>
+      </p:sp>
+      <p:sp>
+        <p:nvSpPr>
+          <p:cNvPr id="25" name="任意多边形 24"/>
+          <p:cNvSpPr/>
+          <p:nvPr/>
+        </p:nvSpPr>
+        <p:spPr>
+          <a:xfrm>
+            <a:off x="2616200" y="3674533"/>
+            <a:ext cx="804333" cy="1465623"/>
+          </a:xfrm>
+          <a:custGeom>
+            <a:avLst/>
+            <a:gdLst>
+              <a:gd name="connsiteX0" fmla="*/ 753533 w 804333"/>
+              <a:gd name="connsiteY0" fmla="*/ 0 h 1465623"/>
+              <a:gd name="connsiteX1" fmla="*/ 762000 w 804333"/>
+              <a:gd name="connsiteY1" fmla="*/ 110067 h 1465623"/>
+              <a:gd name="connsiteX2" fmla="*/ 787400 w 804333"/>
+              <a:gd name="connsiteY2" fmla="*/ 279400 h 1465623"/>
+              <a:gd name="connsiteX3" fmla="*/ 804333 w 804333"/>
+              <a:gd name="connsiteY3" fmla="*/ 381000 h 1465623"/>
+              <a:gd name="connsiteX4" fmla="*/ 795867 w 804333"/>
+              <a:gd name="connsiteY4" fmla="*/ 880534 h 1465623"/>
+              <a:gd name="connsiteX5" fmla="*/ 787400 w 804333"/>
+              <a:gd name="connsiteY5" fmla="*/ 914400 h 1465623"/>
+              <a:gd name="connsiteX6" fmla="*/ 770467 w 804333"/>
+              <a:gd name="connsiteY6" fmla="*/ 1016000 h 1465623"/>
+              <a:gd name="connsiteX7" fmla="*/ 736600 w 804333"/>
+              <a:gd name="connsiteY7" fmla="*/ 1100667 h 1465623"/>
+              <a:gd name="connsiteX8" fmla="*/ 728133 w 804333"/>
+              <a:gd name="connsiteY8" fmla="*/ 1134534 h 1465623"/>
+              <a:gd name="connsiteX9" fmla="*/ 711200 w 804333"/>
+              <a:gd name="connsiteY9" fmla="*/ 1159934 h 1465623"/>
+              <a:gd name="connsiteX10" fmla="*/ 668867 w 804333"/>
+              <a:gd name="connsiteY10" fmla="*/ 1236134 h 1465623"/>
+              <a:gd name="connsiteX11" fmla="*/ 635000 w 804333"/>
+              <a:gd name="connsiteY11" fmla="*/ 1295400 h 1465623"/>
+              <a:gd name="connsiteX12" fmla="*/ 609600 w 804333"/>
+              <a:gd name="connsiteY12" fmla="*/ 1312334 h 1465623"/>
+              <a:gd name="connsiteX13" fmla="*/ 567267 w 804333"/>
+              <a:gd name="connsiteY13" fmla="*/ 1346200 h 1465623"/>
+              <a:gd name="connsiteX14" fmla="*/ 457200 w 804333"/>
+              <a:gd name="connsiteY14" fmla="*/ 1397000 h 1465623"/>
+              <a:gd name="connsiteX15" fmla="*/ 406400 w 804333"/>
+              <a:gd name="connsiteY15" fmla="*/ 1413934 h 1465623"/>
+              <a:gd name="connsiteX16" fmla="*/ 381000 w 804333"/>
+              <a:gd name="connsiteY16" fmla="*/ 1430867 h 1465623"/>
+              <a:gd name="connsiteX17" fmla="*/ 262467 w 804333"/>
+              <a:gd name="connsiteY17" fmla="*/ 1456267 h 1465623"/>
+              <a:gd name="connsiteX18" fmla="*/ 186267 w 804333"/>
+              <a:gd name="connsiteY18" fmla="*/ 1464734 h 1465623"/>
+              <a:gd name="connsiteX19" fmla="*/ 0 w 804333"/>
+              <a:gd name="connsiteY19" fmla="*/ 1464734 h 1465623"/>
+            </a:gdLst>
+            <a:ahLst/>
+            <a:cxnLst>
+              <a:cxn ang="0">
+                <a:pos x="connsiteX0" y="connsiteY0"/>
+              </a:cxn>
+              <a:cxn ang="0">
+                <a:pos x="connsiteX1" y="connsiteY1"/>
+              </a:cxn>
+              <a:cxn ang="0">
+                <a:pos x="connsiteX2" y="connsiteY2"/>
+              </a:cxn>
+              <a:cxn ang="0">
+                <a:pos x="connsiteX3" y="connsiteY3"/>
+              </a:cxn>
+              <a:cxn ang="0">
+                <a:pos x="connsiteX4" y="connsiteY4"/>
+              </a:cxn>
+              <a:cxn ang="0">
+                <a:pos x="connsiteX5" y="connsiteY5"/>
+              </a:cxn>
+              <a:cxn ang="0">
+                <a:pos x="connsiteX6" y="connsiteY6"/>
+              </a:cxn>
+              <a:cxn ang="0">
+                <a:pos x="connsiteX7" y="connsiteY7"/>
+              </a:cxn>
+              <a:cxn ang="0">
+                <a:pos x="connsiteX8" y="connsiteY8"/>
+              </a:cxn>
+              <a:cxn ang="0">
+                <a:pos x="connsiteX9" y="connsiteY9"/>
+              </a:cxn>
+              <a:cxn ang="0">
+                <a:pos x="connsiteX10" y="connsiteY10"/>
+              </a:cxn>
+              <a:cxn ang="0">
+                <a:pos x="connsiteX11" y="connsiteY11"/>
+              </a:cxn>
+              <a:cxn ang="0">
+                <a:pos x="connsiteX12" y="connsiteY12"/>
+              </a:cxn>
+              <a:cxn ang="0">
+                <a:pos x="connsiteX13" y="connsiteY13"/>
+              </a:cxn>
+              <a:cxn ang="0">
+                <a:pos x="connsiteX14" y="connsiteY14"/>
+              </a:cxn>
+              <a:cxn ang="0">
+                <a:pos x="connsiteX15" y="connsiteY15"/>
+              </a:cxn>
+              <a:cxn ang="0">
+                <a:pos x="connsiteX16" y="connsiteY16"/>
+              </a:cxn>
+              <a:cxn ang="0">
+                <a:pos x="connsiteX17" y="connsiteY17"/>
+              </a:cxn>
+              <a:cxn ang="0">
+                <a:pos x="connsiteX18" y="connsiteY18"/>
+              </a:cxn>
+              <a:cxn ang="0">
+                <a:pos x="connsiteX19" y="connsiteY19"/>
+              </a:cxn>
+            </a:cxnLst>
+            <a:rect l="l" t="t" r="r" b="b"/>
+            <a:pathLst>
+              <a:path w="804333" h="1465623">
+                <a:moveTo>
+                  <a:pt x="753533" y="0"/>
+                </a:moveTo>
+                <a:cubicBezTo>
+                  <a:pt x="756355" y="36689"/>
+                  <a:pt x="757936" y="73495"/>
+                  <a:pt x="762000" y="110067"/>
+                </a:cubicBezTo>
+                <a:cubicBezTo>
+                  <a:pt x="790486" y="366439"/>
+                  <a:pt x="768446" y="137253"/>
+                  <a:pt x="787400" y="279400"/>
+                </a:cubicBezTo>
+                <a:cubicBezTo>
+                  <a:pt x="800004" y="373924"/>
+                  <a:pt x="786686" y="328053"/>
+                  <a:pt x="804333" y="381000"/>
+                </a:cubicBezTo>
+                <a:cubicBezTo>
+                  <a:pt x="801511" y="547511"/>
+                  <a:pt x="801151" y="714083"/>
+                  <a:pt x="795867" y="880534"/>
+                </a:cubicBezTo>
+                <a:cubicBezTo>
+                  <a:pt x="795498" y="892164"/>
+                  <a:pt x="789313" y="902922"/>
+                  <a:pt x="787400" y="914400"/>
+                </a:cubicBezTo>
+                <a:cubicBezTo>
+                  <a:pt x="776896" y="977422"/>
+                  <a:pt x="784755" y="968374"/>
+                  <a:pt x="770467" y="1016000"/>
+                </a:cubicBezTo>
+                <a:cubicBezTo>
+                  <a:pt x="724771" y="1168317"/>
+                  <a:pt x="779030" y="987518"/>
+                  <a:pt x="736600" y="1100667"/>
+                </a:cubicBezTo>
+                <a:cubicBezTo>
+                  <a:pt x="732514" y="1111563"/>
+                  <a:pt x="732717" y="1123838"/>
+                  <a:pt x="728133" y="1134534"/>
+                </a:cubicBezTo>
+                <a:cubicBezTo>
+                  <a:pt x="724125" y="1143887"/>
+                  <a:pt x="715751" y="1150833"/>
+                  <a:pt x="711200" y="1159934"/>
+                </a:cubicBezTo>
+                <a:cubicBezTo>
+                  <a:pt x="672396" y="1237542"/>
+                  <a:pt x="718826" y="1169521"/>
+                  <a:pt x="668867" y="1236134"/>
+                </a:cubicBezTo>
+                <a:cubicBezTo>
+                  <a:pt x="659179" y="1265196"/>
+                  <a:pt x="660629" y="1269771"/>
+                  <a:pt x="635000" y="1295400"/>
+                </a:cubicBezTo>
+                <a:cubicBezTo>
+                  <a:pt x="627805" y="1302595"/>
+                  <a:pt x="617741" y="1306229"/>
+                  <a:pt x="609600" y="1312334"/>
+                </a:cubicBezTo>
+                <a:cubicBezTo>
+                  <a:pt x="595143" y="1323177"/>
+                  <a:pt x="582657" y="1336729"/>
+                  <a:pt x="567267" y="1346200"/>
+                </a:cubicBezTo>
+                <a:cubicBezTo>
+                  <a:pt x="538990" y="1363601"/>
+                  <a:pt x="491030" y="1384698"/>
+                  <a:pt x="457200" y="1397000"/>
+                </a:cubicBezTo>
+                <a:cubicBezTo>
+                  <a:pt x="440425" y="1403100"/>
+                  <a:pt x="422711" y="1406685"/>
+                  <a:pt x="406400" y="1413934"/>
+                </a:cubicBezTo>
+                <a:cubicBezTo>
+                  <a:pt x="397101" y="1418067"/>
+                  <a:pt x="390299" y="1426734"/>
+                  <a:pt x="381000" y="1430867"/>
+                </a:cubicBezTo>
+                <a:cubicBezTo>
+                  <a:pt x="334734" y="1451429"/>
+                  <a:pt x="314615" y="1450132"/>
+                  <a:pt x="262467" y="1456267"/>
+                </a:cubicBezTo>
+                <a:cubicBezTo>
+                  <a:pt x="237086" y="1459253"/>
+                  <a:pt x="211810" y="1463910"/>
+                  <a:pt x="186267" y="1464734"/>
+                </a:cubicBezTo>
+                <a:cubicBezTo>
+                  <a:pt x="124210" y="1466736"/>
+                  <a:pt x="62089" y="1464734"/>
+                  <a:pt x="0" y="1464734"/>
+                </a:cubicBezTo>
+              </a:path>
+            </a:pathLst>
+          </a:custGeom>
+          <a:noFill/>
+          <a:ln>
+            <a:noFill/>
+          </a:ln>
+        </p:spPr>
+        <p:style>
+          <a:lnRef idx="2">
+            <a:schemeClr val="accent1">
+              <a:shade val="50000"/>
+            </a:schemeClr>
+          </a:lnRef>
+          <a:fillRef idx="1">
+            <a:schemeClr val="accent1"/>
+          </a:fillRef>
+          <a:effectRef idx="0">
+            <a:schemeClr val="accent1"/>
+          </a:effectRef>
+          <a:fontRef idx="minor">
+            <a:schemeClr val="lt1"/>
+          </a:fontRef>
+        </p:style>
+        <p:txBody>
+          <a:bodyPr rtlCol="0" anchor="ctr"/>
+          <a:lstStyle/>
+          <a:p>
+            <a:pPr algn="ctr"/>
+            <a:endParaRPr lang="zh-CN" altLang="en-US"/>
+          </a:p>
+        </p:txBody>
+      </p:sp>
+      <p:sp>
+        <p:nvSpPr>
+          <p:cNvPr id="28" name="任意多边形 27"/>
+          <p:cNvSpPr/>
+          <p:nvPr/>
+        </p:nvSpPr>
+        <p:spPr>
+          <a:xfrm>
+            <a:off x="2624667" y="3674533"/>
+            <a:ext cx="779016" cy="1422400"/>
+          </a:xfrm>
+          <a:custGeom>
+            <a:avLst/>
+            <a:gdLst>
+              <a:gd name="connsiteX0" fmla="*/ 762000 w 779016"/>
+              <a:gd name="connsiteY0" fmla="*/ 0 h 1422400"/>
+              <a:gd name="connsiteX1" fmla="*/ 778933 w 779016"/>
+              <a:gd name="connsiteY1" fmla="*/ 355600 h 1422400"/>
+              <a:gd name="connsiteX2" fmla="*/ 762000 w 779016"/>
+              <a:gd name="connsiteY2" fmla="*/ 897467 h 1422400"/>
+              <a:gd name="connsiteX3" fmla="*/ 753533 w 779016"/>
+              <a:gd name="connsiteY3" fmla="*/ 948267 h 1422400"/>
+              <a:gd name="connsiteX4" fmla="*/ 745066 w 779016"/>
+              <a:gd name="connsiteY4" fmla="*/ 982134 h 1422400"/>
+              <a:gd name="connsiteX5" fmla="*/ 702733 w 779016"/>
+              <a:gd name="connsiteY5" fmla="*/ 1075267 h 1422400"/>
+              <a:gd name="connsiteX6" fmla="*/ 651933 w 779016"/>
+              <a:gd name="connsiteY6" fmla="*/ 1159934 h 1422400"/>
+              <a:gd name="connsiteX7" fmla="*/ 601133 w 779016"/>
+              <a:gd name="connsiteY7" fmla="*/ 1219200 h 1422400"/>
+              <a:gd name="connsiteX8" fmla="*/ 541866 w 779016"/>
+              <a:gd name="connsiteY8" fmla="*/ 1270000 h 1422400"/>
+              <a:gd name="connsiteX9" fmla="*/ 491066 w 779016"/>
+              <a:gd name="connsiteY9" fmla="*/ 1303867 h 1422400"/>
+              <a:gd name="connsiteX10" fmla="*/ 381000 w 779016"/>
+              <a:gd name="connsiteY10" fmla="*/ 1371600 h 1422400"/>
+              <a:gd name="connsiteX11" fmla="*/ 287866 w 779016"/>
+              <a:gd name="connsiteY11" fmla="*/ 1405467 h 1422400"/>
+              <a:gd name="connsiteX12" fmla="*/ 254000 w 779016"/>
+              <a:gd name="connsiteY12" fmla="*/ 1413934 h 1422400"/>
+              <a:gd name="connsiteX13" fmla="*/ 220133 w 779016"/>
+              <a:gd name="connsiteY13" fmla="*/ 1422400 h 1422400"/>
+              <a:gd name="connsiteX14" fmla="*/ 0 w 779016"/>
+              <a:gd name="connsiteY14" fmla="*/ 1413934 h 1422400"/>
+            </a:gdLst>
+            <a:ahLst/>
+            <a:cxnLst>
+              <a:cxn ang="0">
+                <a:pos x="connsiteX0" y="connsiteY0"/>
+              </a:cxn>
+              <a:cxn ang="0">
+                <a:pos x="connsiteX1" y="connsiteY1"/>
+              </a:cxn>
+              <a:cxn ang="0">
+                <a:pos x="connsiteX2" y="connsiteY2"/>
+              </a:cxn>
+              <a:cxn ang="0">
+                <a:pos x="connsiteX3" y="connsiteY3"/>
+              </a:cxn>
+              <a:cxn ang="0">
+                <a:pos x="connsiteX4" y="connsiteY4"/>
+              </a:cxn>
+              <a:cxn ang="0">
+                <a:pos x="connsiteX5" y="connsiteY5"/>
+              </a:cxn>
+              <a:cxn ang="0">
+                <a:pos x="connsiteX6" y="connsiteY6"/>
+              </a:cxn>
+              <a:cxn ang="0">
+                <a:pos x="connsiteX7" y="connsiteY7"/>
+              </a:cxn>
+              <a:cxn ang="0">
+                <a:pos x="connsiteX8" y="connsiteY8"/>
+              </a:cxn>
+              <a:cxn ang="0">
+                <a:pos x="connsiteX9" y="connsiteY9"/>
+              </a:cxn>
+              <a:cxn ang="0">
+                <a:pos x="connsiteX10" y="connsiteY10"/>
+              </a:cxn>
+              <a:cxn ang="0">
+                <a:pos x="connsiteX11" y="connsiteY11"/>
+              </a:cxn>
+              <a:cxn ang="0">
+                <a:pos x="connsiteX12" y="connsiteY12"/>
+              </a:cxn>
+              <a:cxn ang="0">
+                <a:pos x="connsiteX13" y="connsiteY13"/>
+              </a:cxn>
+              <a:cxn ang="0">
+                <a:pos x="connsiteX14" y="connsiteY14"/>
+              </a:cxn>
+            </a:cxnLst>
+            <a:rect l="l" t="t" r="r" b="b"/>
+            <a:pathLst>
+              <a:path w="779016" h="1422400">
+                <a:moveTo>
+                  <a:pt x="762000" y="0"/>
+                </a:moveTo>
+                <a:cubicBezTo>
+                  <a:pt x="769321" y="109822"/>
+                  <a:pt x="780069" y="252216"/>
+                  <a:pt x="778933" y="355600"/>
+                </a:cubicBezTo>
+                <a:cubicBezTo>
+                  <a:pt x="776947" y="536300"/>
+                  <a:pt x="769738" y="716922"/>
+                  <a:pt x="762000" y="897467"/>
+                </a:cubicBezTo>
+                <a:cubicBezTo>
+                  <a:pt x="761265" y="914618"/>
+                  <a:pt x="756900" y="931433"/>
+                  <a:pt x="753533" y="948267"/>
+                </a:cubicBezTo>
+                <a:cubicBezTo>
+                  <a:pt x="751251" y="959677"/>
+                  <a:pt x="748746" y="971095"/>
+                  <a:pt x="745066" y="982134"/>
+                </a:cubicBezTo>
+                <a:cubicBezTo>
+                  <a:pt x="735604" y="1010520"/>
+                  <a:pt x="716864" y="1050144"/>
+                  <a:pt x="702733" y="1075267"/>
+                </a:cubicBezTo>
+                <a:cubicBezTo>
+                  <a:pt x="686597" y="1103953"/>
+                  <a:pt x="675206" y="1136661"/>
+                  <a:pt x="651933" y="1159934"/>
+                </a:cubicBezTo>
+                <a:cubicBezTo>
+                  <a:pt x="588906" y="1222961"/>
+                  <a:pt x="666302" y="1143171"/>
+                  <a:pt x="601133" y="1219200"/>
+                </a:cubicBezTo>
+                <a:cubicBezTo>
+                  <a:pt x="582339" y="1241127"/>
+                  <a:pt x="565768" y="1253269"/>
+                  <a:pt x="541866" y="1270000"/>
+                </a:cubicBezTo>
+                <a:cubicBezTo>
+                  <a:pt x="525193" y="1281671"/>
+                  <a:pt x="507477" y="1291832"/>
+                  <a:pt x="491066" y="1303867"/>
+                </a:cubicBezTo>
+                <a:cubicBezTo>
+                  <a:pt x="397830" y="1372241"/>
+                  <a:pt x="448923" y="1354620"/>
+                  <a:pt x="381000" y="1371600"/>
+                </a:cubicBezTo>
+                <a:cubicBezTo>
+                  <a:pt x="336235" y="1401444"/>
+                  <a:pt x="365473" y="1386065"/>
+                  <a:pt x="287866" y="1405467"/>
+                </a:cubicBezTo>
+                <a:lnTo>
+                  <a:pt x="254000" y="1413934"/>
+                </a:lnTo>
+                <a:lnTo>
+                  <a:pt x="220133" y="1422400"/>
+                </a:lnTo>
+                <a:cubicBezTo>
+                  <a:pt x="146760" y="1419465"/>
+                  <a:pt x="73432" y="1413934"/>
+                  <a:pt x="0" y="1413934"/>
+                </a:cubicBezTo>
+              </a:path>
+            </a:pathLst>
+          </a:custGeom>
+          <a:noFill/>
+          <a:ln>
+            <a:noFill/>
+          </a:ln>
+        </p:spPr>
+        <p:style>
+          <a:lnRef idx="2">
+            <a:schemeClr val="accent1">
+              <a:shade val="50000"/>
+            </a:schemeClr>
+          </a:lnRef>
+          <a:fillRef idx="1">
+            <a:schemeClr val="accent1"/>
+          </a:fillRef>
+          <a:effectRef idx="0">
+            <a:schemeClr val="accent1"/>
+          </a:effectRef>
+          <a:fontRef idx="minor">
+            <a:schemeClr val="lt1"/>
+          </a:fontRef>
+        </p:style>
+        <p:txBody>
+          <a:bodyPr rtlCol="0" anchor="ctr"/>
+          <a:lstStyle/>
+          <a:p>
+            <a:pPr algn="ctr"/>
+            <a:endParaRPr lang="zh-CN" altLang="en-US"/>
+          </a:p>
+        </p:txBody>
+      </p:sp>
+      <p:grpSp>
+        <p:nvGrpSpPr>
+          <p:cNvPr id="66" name="组合 65"/>
+          <p:cNvGrpSpPr/>
+          <p:nvPr/>
+        </p:nvGrpSpPr>
+        <p:grpSpPr>
+          <a:xfrm>
+            <a:off x="2540001" y="3670136"/>
+            <a:ext cx="846748" cy="1453087"/>
+            <a:chOff x="2540001" y="3670136"/>
+            <a:chExt cx="846748" cy="1453087"/>
+          </a:xfrm>
+        </p:grpSpPr>
+        <p:cxnSp>
+          <p:nvCxnSpPr>
+            <p:cNvPr id="42" name="直接连接符 41"/>
+            <p:cNvCxnSpPr/>
+            <p:nvPr/>
+          </p:nvCxnSpPr>
+          <p:spPr>
+            <a:xfrm flipH="1">
+              <a:off x="3369111" y="3670136"/>
+              <a:ext cx="15057" cy="1453087"/>
+            </a:xfrm>
+            <a:prstGeom prst="line">
+              <a:avLst/>
+            </a:prstGeom>
+            <a:ln w="57150">
+              <a:solidFill>
+                <a:srgbClr val="FF0000"/>
+              </a:solidFill>
+            </a:ln>
+          </p:spPr>
+          <p:style>
+            <a:lnRef idx="1">
+              <a:schemeClr val="accent1"/>
+            </a:lnRef>
+            <a:fillRef idx="0">
+              <a:schemeClr val="accent1"/>
+            </a:fillRef>
+            <a:effectRef idx="0">
+              <a:schemeClr val="accent1"/>
+            </a:effectRef>
+            <a:fontRef idx="minor">
+              <a:schemeClr val="tx1"/>
+            </a:fontRef>
+          </p:style>
+        </p:cxnSp>
+        <p:cxnSp>
+          <p:nvCxnSpPr>
+            <p:cNvPr id="46" name="直接箭头连接符 45"/>
+            <p:cNvCxnSpPr/>
+            <p:nvPr/>
+          </p:nvCxnSpPr>
+          <p:spPr>
+            <a:xfrm flipH="1">
+              <a:off x="2540001" y="5106238"/>
+              <a:ext cx="846748" cy="0"/>
+            </a:xfrm>
+            <a:prstGeom prst="straightConnector1">
+              <a:avLst/>
+            </a:prstGeom>
+            <a:ln w="57150">
+              <a:solidFill>
+                <a:srgbClr val="FF0000"/>
+              </a:solidFill>
+              <a:tailEnd type="triangle"/>
+            </a:ln>
+          </p:spPr>
+          <p:style>
+            <a:lnRef idx="1">
+              <a:schemeClr val="accent1"/>
+            </a:lnRef>
+            <a:fillRef idx="0">
+              <a:schemeClr val="accent1"/>
+            </a:fillRef>
+            <a:effectRef idx="0">
+              <a:schemeClr val="accent1"/>
+            </a:effectRef>
+            <a:fontRef idx="minor">
+              <a:schemeClr val="tx1"/>
+            </a:fontRef>
+          </p:style>
+        </p:cxnSp>
+      </p:grpSp>
+      <p:grpSp>
+        <p:nvGrpSpPr>
+          <p:cNvPr id="55" name="组合 54"/>
+          <p:cNvGrpSpPr/>
+          <p:nvPr/>
+        </p:nvGrpSpPr>
+        <p:grpSpPr>
+          <a:xfrm>
+            <a:off x="4256731" y="3676307"/>
+            <a:ext cx="526936" cy="1455382"/>
+            <a:chOff x="4256731" y="3676307"/>
+            <a:chExt cx="526936" cy="1455382"/>
+          </a:xfrm>
+        </p:grpSpPr>
+        <p:cxnSp>
+          <p:nvCxnSpPr>
+            <p:cNvPr id="50" name="直接连接符 49"/>
+            <p:cNvCxnSpPr/>
+            <p:nvPr/>
+          </p:nvCxnSpPr>
+          <p:spPr>
+            <a:xfrm>
+              <a:off x="4783667" y="3676307"/>
+              <a:ext cx="0" cy="1455382"/>
+            </a:xfrm>
+            <a:prstGeom prst="line">
+              <a:avLst/>
+            </a:prstGeom>
+            <a:ln w="57150">
+              <a:solidFill>
+                <a:srgbClr val="FF0000"/>
+              </a:solidFill>
+            </a:ln>
+          </p:spPr>
+          <p:style>
+            <a:lnRef idx="1">
+              <a:schemeClr val="accent1"/>
+            </a:lnRef>
+            <a:fillRef idx="0">
+              <a:schemeClr val="accent1"/>
+            </a:fillRef>
+            <a:effectRef idx="0">
+              <a:schemeClr val="accent1"/>
+            </a:effectRef>
+            <a:fontRef idx="minor">
+              <a:schemeClr val="tx1"/>
+            </a:fontRef>
+          </p:style>
+        </p:cxnSp>
+        <p:cxnSp>
+          <p:nvCxnSpPr>
+            <p:cNvPr id="51" name="直接箭头连接符 50"/>
+            <p:cNvCxnSpPr/>
+            <p:nvPr/>
+          </p:nvCxnSpPr>
+          <p:spPr>
+            <a:xfrm flipH="1">
+              <a:off x="4256731" y="5106238"/>
+              <a:ext cx="526936" cy="0"/>
+            </a:xfrm>
+            <a:prstGeom prst="straightConnector1">
+              <a:avLst/>
+            </a:prstGeom>
+            <a:ln w="57150">
+              <a:solidFill>
+                <a:srgbClr val="FF0000"/>
+              </a:solidFill>
+              <a:tailEnd type="triangle"/>
+            </a:ln>
+          </p:spPr>
+          <p:style>
+            <a:lnRef idx="1">
+              <a:schemeClr val="accent1"/>
+            </a:lnRef>
+            <a:fillRef idx="0">
+              <a:schemeClr val="accent1"/>
+            </a:fillRef>
+            <a:effectRef idx="0">
+              <a:schemeClr val="accent1"/>
+            </a:effectRef>
+            <a:fontRef idx="minor">
+              <a:schemeClr val="tx1"/>
+            </a:fontRef>
+          </p:style>
+        </p:cxnSp>
+      </p:grpSp>
     </p:spTree>
     <p:extLst>
       <p:ext uri="{BB962C8B-B14F-4D97-AF65-F5344CB8AC3E}">
@@ -14974,6 +15780,114 @@
                                   </p:childTnLst>
                                 </p:cTn>
                               </p:par>
+                              <p:par>
+                                <p:cTn id="13" presetID="1" presetClass="entr" presetSubtype="0" fill="hold" grpId="0" nodeType="withEffect">
+                                  <p:stCondLst>
+                                    <p:cond delay="0"/>
+                                  </p:stCondLst>
+                                  <p:childTnLst>
+                                    <p:set>
+                                      <p:cBhvr>
+                                        <p:cTn id="14" dur="1" fill="hold">
+                                          <p:stCondLst>
+                                            <p:cond delay="0"/>
+                                          </p:stCondLst>
+                                        </p:cTn>
+                                        <p:tgtEl>
+                                          <p:spTgt spid="9"/>
+                                        </p:tgtEl>
+                                        <p:attrNameLst>
+                                          <p:attrName>style.visibility</p:attrName>
+                                        </p:attrNameLst>
+                                      </p:cBhvr>
+                                      <p:to>
+                                        <p:strVal val="visible"/>
+                                      </p:to>
+                                    </p:set>
+                                  </p:childTnLst>
+                                </p:cTn>
+                              </p:par>
+                              <p:par>
+                                <p:cTn id="15" presetID="1" presetClass="entr" presetSubtype="0" fill="hold" grpId="0" nodeType="withEffect">
+                                  <p:stCondLst>
+                                    <p:cond delay="0"/>
+                                  </p:stCondLst>
+                                  <p:childTnLst>
+                                    <p:set>
+                                      <p:cBhvr>
+                                        <p:cTn id="16" dur="1" fill="hold">
+                                          <p:stCondLst>
+                                            <p:cond delay="0"/>
+                                          </p:stCondLst>
+                                        </p:cTn>
+                                        <p:tgtEl>
+                                          <p:spTgt spid="8"/>
+                                        </p:tgtEl>
+                                        <p:attrNameLst>
+                                          <p:attrName>style.visibility</p:attrName>
+                                        </p:attrNameLst>
+                                      </p:cBhvr>
+                                      <p:to>
+                                        <p:strVal val="visible"/>
+                                      </p:to>
+                                    </p:set>
+                                  </p:childTnLst>
+                                </p:cTn>
+                              </p:par>
+                              <p:par>
+                                <p:cTn id="17" presetID="1" presetClass="entr" presetSubtype="0" fill="hold" grpId="0" nodeType="withEffect">
+                                  <p:stCondLst>
+                                    <p:cond delay="0"/>
+                                  </p:stCondLst>
+                                  <p:childTnLst>
+                                    <p:set>
+                                      <p:cBhvr>
+                                        <p:cTn id="18" dur="1" fill="hold">
+                                          <p:stCondLst>
+                                            <p:cond delay="0"/>
+                                          </p:stCondLst>
+                                        </p:cTn>
+                                        <p:tgtEl>
+                                          <p:spTgt spid="2"/>
+                                        </p:tgtEl>
+                                        <p:attrNameLst>
+                                          <p:attrName>style.visibility</p:attrName>
+                                        </p:attrNameLst>
+                                      </p:cBhvr>
+                                      <p:to>
+                                        <p:strVal val="visible"/>
+                                      </p:to>
+                                    </p:set>
+                                  </p:childTnLst>
+                                </p:cTn>
+                              </p:par>
+                              <p:par>
+                                <p:cTn id="19" presetID="1" presetClass="entr" presetSubtype="0" fill="hold" grpId="0" nodeType="withEffect">
+                                  <p:stCondLst>
+                                    <p:cond delay="0"/>
+                                  </p:stCondLst>
+                                  <p:childTnLst>
+                                    <p:set>
+                                      <p:cBhvr>
+                                        <p:cTn id="20" dur="1" fill="hold">
+                                          <p:stCondLst>
+                                            <p:cond delay="0"/>
+                                          </p:stCondLst>
+                                        </p:cTn>
+                                        <p:tgtEl>
+                                          <p:spTgt spid="7"/>
+                                        </p:tgtEl>
+                                        <p:attrNameLst>
+                                          <p:attrName>style.visibility</p:attrName>
+                                        </p:attrNameLst>
+                                      </p:cBhvr>
+                                      <p:to>
+                                        <p:strVal val="visible"/>
+                                      </p:to>
+                                    </p:set>
+                                  </p:childTnLst>
+                                </p:cTn>
+                              </p:par>
                             </p:childTnLst>
                           </p:cTn>
                         </p:par>
@@ -14981,26 +15895,26 @@
                     </p:cTn>
                   </p:par>
                   <p:par>
-                    <p:cTn id="13" fill="hold">
+                    <p:cTn id="21" fill="hold">
                       <p:stCondLst>
                         <p:cond delay="indefinite"/>
                       </p:stCondLst>
                       <p:childTnLst>
                         <p:par>
-                          <p:cTn id="14" fill="hold">
+                          <p:cTn id="22" fill="hold">
                             <p:stCondLst>
                               <p:cond delay="0"/>
                             </p:stCondLst>
                             <p:childTnLst>
                               <p:par>
-                                <p:cTn id="15" presetID="1" presetClass="exit" presetSubtype="0" fill="hold" nodeType="clickEffect">
+                                <p:cTn id="23" presetID="1" presetClass="exit" presetSubtype="0" fill="hold" nodeType="clickEffect">
                                   <p:stCondLst>
                                     <p:cond delay="0"/>
                                   </p:stCondLst>
                                   <p:childTnLst>
                                     <p:set>
                                       <p:cBhvr>
-                                        <p:cTn id="16" dur="1" fill="hold">
+                                        <p:cTn id="24" dur="1" fill="hold">
                                           <p:stCondLst>
                                             <p:cond delay="0"/>
                                           </p:stCondLst>
@@ -15020,20 +15934,182 @@
                                 </p:cTn>
                               </p:par>
                               <p:par>
-                                <p:cTn id="17" presetID="1" presetClass="entr" presetSubtype="0" fill="hold" nodeType="withEffect">
+                                <p:cTn id="25" presetID="1" presetClass="entr" presetSubtype="0" fill="hold" nodeType="withEffect">
                                   <p:stCondLst>
                                     <p:cond delay="0"/>
                                   </p:stCondLst>
                                   <p:childTnLst>
                                     <p:set>
                                       <p:cBhvr>
-                                        <p:cTn id="18" dur="1" fill="hold">
+                                        <p:cTn id="26" dur="1" fill="hold">
                                           <p:stCondLst>
                                             <p:cond delay="0"/>
                                           </p:stCondLst>
                                         </p:cTn>
                                         <p:tgtEl>
                                           <p:spTgt spid="5"/>
+                                        </p:tgtEl>
+                                        <p:attrNameLst>
+                                          <p:attrName>style.visibility</p:attrName>
+                                        </p:attrNameLst>
+                                      </p:cBhvr>
+                                      <p:to>
+                                        <p:strVal val="visible"/>
+                                      </p:to>
+                                    </p:set>
+                                  </p:childTnLst>
+                                </p:cTn>
+                              </p:par>
+                              <p:par>
+                                <p:cTn id="27" presetID="1" presetClass="exit" presetSubtype="0" fill="hold" grpId="1" nodeType="withEffect">
+                                  <p:stCondLst>
+                                    <p:cond delay="0"/>
+                                  </p:stCondLst>
+                                  <p:childTnLst>
+                                    <p:set>
+                                      <p:cBhvr>
+                                        <p:cTn id="28" dur="1" fill="hold">
+                                          <p:stCondLst>
+                                            <p:cond delay="0"/>
+                                          </p:stCondLst>
+                                        </p:cTn>
+                                        <p:tgtEl>
+                                          <p:spTgt spid="9"/>
+                                        </p:tgtEl>
+                                        <p:attrNameLst>
+                                          <p:attrName>style.visibility</p:attrName>
+                                        </p:attrNameLst>
+                                      </p:cBhvr>
+                                      <p:to>
+                                        <p:strVal val="hidden"/>
+                                      </p:to>
+                                    </p:set>
+                                  </p:childTnLst>
+                                </p:cTn>
+                              </p:par>
+                              <p:par>
+                                <p:cTn id="29" presetID="1" presetClass="exit" presetSubtype="0" fill="hold" grpId="1" nodeType="withEffect">
+                                  <p:stCondLst>
+                                    <p:cond delay="0"/>
+                                  </p:stCondLst>
+                                  <p:childTnLst>
+                                    <p:set>
+                                      <p:cBhvr>
+                                        <p:cTn id="30" dur="1" fill="hold">
+                                          <p:stCondLst>
+                                            <p:cond delay="0"/>
+                                          </p:stCondLst>
+                                        </p:cTn>
+                                        <p:tgtEl>
+                                          <p:spTgt spid="8"/>
+                                        </p:tgtEl>
+                                        <p:attrNameLst>
+                                          <p:attrName>style.visibility</p:attrName>
+                                        </p:attrNameLst>
+                                      </p:cBhvr>
+                                      <p:to>
+                                        <p:strVal val="hidden"/>
+                                      </p:to>
+                                    </p:set>
+                                  </p:childTnLst>
+                                </p:cTn>
+                              </p:par>
+                              <p:par>
+                                <p:cTn id="31" presetID="1" presetClass="exit" presetSubtype="0" fill="hold" grpId="1" nodeType="withEffect">
+                                  <p:stCondLst>
+                                    <p:cond delay="0"/>
+                                  </p:stCondLst>
+                                  <p:childTnLst>
+                                    <p:set>
+                                      <p:cBhvr>
+                                        <p:cTn id="32" dur="1" fill="hold">
+                                          <p:stCondLst>
+                                            <p:cond delay="0"/>
+                                          </p:stCondLst>
+                                        </p:cTn>
+                                        <p:tgtEl>
+                                          <p:spTgt spid="2"/>
+                                        </p:tgtEl>
+                                        <p:attrNameLst>
+                                          <p:attrName>style.visibility</p:attrName>
+                                        </p:attrNameLst>
+                                      </p:cBhvr>
+                                      <p:to>
+                                        <p:strVal val="hidden"/>
+                                      </p:to>
+                                    </p:set>
+                                  </p:childTnLst>
+                                </p:cTn>
+                              </p:par>
+                              <p:par>
+                                <p:cTn id="33" presetID="1" presetClass="exit" presetSubtype="0" fill="hold" grpId="1" nodeType="withEffect">
+                                  <p:stCondLst>
+                                    <p:cond delay="0"/>
+                                  </p:stCondLst>
+                                  <p:childTnLst>
+                                    <p:set>
+                                      <p:cBhvr>
+                                        <p:cTn id="34" dur="1" fill="hold">
+                                          <p:stCondLst>
+                                            <p:cond delay="0"/>
+                                          </p:stCondLst>
+                                        </p:cTn>
+                                        <p:tgtEl>
+                                          <p:spTgt spid="7"/>
+                                        </p:tgtEl>
+                                        <p:attrNameLst>
+                                          <p:attrName>style.visibility</p:attrName>
+                                        </p:attrNameLst>
+                                      </p:cBhvr>
+                                      <p:to>
+                                        <p:strVal val="hidden"/>
+                                      </p:to>
+                                    </p:set>
+                                  </p:childTnLst>
+                                </p:cTn>
+                              </p:par>
+                              <p:par>
+                                <p:cTn id="35" presetID="1" presetClass="entr" presetSubtype="0" fill="hold" nodeType="withEffect">
+                                  <p:stCondLst>
+                                    <p:cond delay="0"/>
+                                  </p:stCondLst>
+                                  <p:childTnLst>
+                                    <p:set>
+                                      <p:cBhvr>
+                                        <p:cTn id="36" dur="1" fill="hold">
+                                          <p:stCondLst>
+                                            <p:cond delay="0"/>
+                                          </p:stCondLst>
+                                        </p:cTn>
+                                        <p:tgtEl>
+                                          <p:spTgt spid="55"/>
+                                        </p:tgtEl>
+                                        <p:attrNameLst>
+                                          <p:attrName>style.visibility</p:attrName>
+                                        </p:attrNameLst>
+                                      </p:cBhvr>
+                                      <p:to>
+                                        <p:strVal val="visible"/>
+                                      </p:to>
+                                    </p:set>
+                                  </p:childTnLst>
+                                </p:cTn>
+                              </p:par>
+                              <p:par>
+                                <p:cTn id="37" presetID="1" presetClass="entr" presetSubtype="0" fill="hold" nodeType="withEffect">
+                                  <p:stCondLst>
+                                    <p:cond delay="0"/>
+                                  </p:stCondLst>
+                                  <p:childTnLst>
+                                    <p:set>
+                                      <p:cBhvr>
+                                        <p:cTn id="38" dur="1" fill="hold">
+                                          <p:stCondLst>
+                                            <p:cond delay="0"/>
+                                          </p:stCondLst>
+                                        </p:cTn>
+                                        <p:tgtEl>
+                                          <p:spTgt spid="66"/>
                                         </p:tgtEl>
                                         <p:attrNameLst>
                                           <p:attrName>style.visibility</p:attrName>
@@ -15073,6 +16149,16 @@
         </p:cTn>
       </p:par>
     </p:tnLst>
+    <p:bldLst>
+      <p:bldP spid="2" grpId="0" animBg="1"/>
+      <p:bldP spid="2" grpId="1" animBg="1"/>
+      <p:bldP spid="7" grpId="0" animBg="1"/>
+      <p:bldP spid="7" grpId="1" animBg="1"/>
+      <p:bldP spid="8" grpId="0" animBg="1"/>
+      <p:bldP spid="8" grpId="1" animBg="1"/>
+      <p:bldP spid="9" grpId="0" animBg="1"/>
+      <p:bldP spid="9" grpId="1" animBg="1"/>
+    </p:bldLst>
   </p:timing>
 </p:sld>
 </file>
@@ -15111,11 +16197,7 @@
           <a:p>
             <a:r>
               <a:rPr lang="zh-CN" altLang="en-US" dirty="0" smtClean="0"/>
-              <a:t>寻找中间值（</a:t>
-            </a:r>
-            <a:r>
-              <a:rPr lang="zh-CN" altLang="en-US" dirty="0" smtClean="0"/>
-              <a:t>续</a:t>
+              <a:t>寻找中间值（续</a:t>
             </a:r>
             <a:r>
               <a:rPr lang="en-US" altLang="zh-CN" dirty="0" smtClean="0"/>
@@ -22782,7 +23864,7 @@
         <p:spPr>
           <a:xfrm>
             <a:off x="494024" y="1898470"/>
-            <a:ext cx="8075210" cy="3970318"/>
+            <a:ext cx="8075210" cy="4293483"/>
           </a:xfrm>
           <a:prstGeom prst="rect">
             <a:avLst/>
@@ -22804,15 +23886,19 @@
             </a:pPr>
             <a:r>
               <a:rPr lang="zh-CN" altLang="en-US" sz="1400" b="1" dirty="0"/>
-              <a:t>首先是可以对 </a:t>
-            </a:r>
-            <a:r>
-              <a:rPr lang="en-US" altLang="zh-CN" sz="1400" b="1" dirty="0"/>
-              <a:t>ZUC </a:t>
+              <a:t>首先是可以</a:t>
+            </a:r>
+            <a:r>
+              <a:rPr lang="zh-CN" altLang="en-US" sz="1400" b="1" dirty="0" smtClean="0"/>
+              <a:t>对祖冲之算法</a:t>
             </a:r>
             <a:r>
               <a:rPr lang="zh-CN" altLang="en-US" sz="1400" b="1" dirty="0"/>
-              <a:t>算法的分析方法进行改进。</a:t>
+              <a:t>的分析方法进行</a:t>
+            </a:r>
+            <a:r>
+              <a:rPr lang="zh-CN" altLang="en-US" sz="1400" b="1" dirty="0" smtClean="0"/>
+              <a:t>改进并比较不同方法的优劣。</a:t>
             </a:r>
             <a:r>
               <a:rPr lang="zh-CN" altLang="en-US" sz="1400" dirty="0"/>
@@ -22874,15 +23960,15 @@
             </a:r>
             <a:r>
               <a:rPr lang="zh-CN" altLang="en-US" sz="1400" dirty="0"/>
-              <a:t>本次实验仅仅是完成了对 </a:t>
-            </a:r>
-            <a:r>
-              <a:rPr lang="en-US" altLang="zh-CN" sz="1400" dirty="0"/>
-              <a:t>ZUC </a:t>
+              <a:t>本次实验仅仅是完成了</a:t>
+            </a:r>
+            <a:r>
+              <a:rPr lang="zh-CN" altLang="en-US" sz="1400" dirty="0" smtClean="0"/>
+              <a:t>对祖冲之算法中单个字节的</a:t>
             </a:r>
             <a:r>
               <a:rPr lang="zh-CN" altLang="en-US" sz="1400" dirty="0"/>
-              <a:t>算法的攻击，</a:t>
+              <a:t>攻击，</a:t>
             </a:r>
             <a:r>
               <a:rPr lang="zh-CN" altLang="en-US" sz="1400" dirty="0" smtClean="0"/>
@@ -22890,15 +23976,35 @@
             </a:r>
             <a:r>
               <a:rPr lang="zh-CN" altLang="en-US" sz="1400" dirty="0"/>
-              <a:t>将这些方法中的核心思路和关键技术抽象出来，把他们应用到更多的序列密码算法电路中，</a:t>
+              <a:t>将这些方法中的核心思路和关键技术抽象出来，把他们应用</a:t>
             </a:r>
             <a:r>
               <a:rPr lang="zh-CN" altLang="en-US" sz="1400" dirty="0" smtClean="0"/>
-              <a:t>可能</a:t>
+              <a:t>到</a:t>
+            </a:r>
+            <a:r>
+              <a:rPr lang="zh-CN" altLang="en-US" sz="1400" dirty="0" smtClean="0"/>
+              <a:t>完整</a:t>
+            </a:r>
+            <a:r>
+              <a:rPr lang="zh-CN" altLang="en-US" sz="1400" dirty="0" smtClean="0"/>
+              <a:t>的祖冲之算法乃至其他序列密码</a:t>
             </a:r>
             <a:r>
               <a:rPr lang="zh-CN" altLang="en-US" sz="1400" dirty="0"/>
-              <a:t>会有更高的实用价值</a:t>
+              <a:t>算法电路</a:t>
+            </a:r>
+            <a:r>
+              <a:rPr lang="zh-CN" altLang="en-US" sz="1400"/>
+              <a:t>中</a:t>
+            </a:r>
+            <a:r>
+              <a:rPr lang="zh-CN" altLang="en-US" sz="1400" smtClean="0"/>
+              <a:t>，会</a:t>
+            </a:r>
+            <a:r>
+              <a:rPr lang="zh-CN" altLang="en-US" sz="1400" dirty="0"/>
+              <a:t>有更高的实用价值</a:t>
             </a:r>
             <a:r>
               <a:rPr lang="zh-CN" altLang="en-US" sz="1400" dirty="0" smtClean="0"/>
@@ -22929,19 +24035,31 @@
             </a:r>
             <a:r>
               <a:rPr lang="zh-CN" altLang="en-US" sz="1400" b="1" dirty="0"/>
-              <a:t>是可以针对 </a:t>
-            </a:r>
-            <a:r>
-              <a:rPr lang="en-US" altLang="zh-CN" sz="1400" b="1" dirty="0"/>
-              <a:t>ZUC </a:t>
+              <a:t>是可以</a:t>
+            </a:r>
+            <a:r>
+              <a:rPr lang="zh-CN" altLang="en-US" sz="1400" b="1" dirty="0" smtClean="0"/>
+              <a:t>针对祖冲之算法</a:t>
             </a:r>
             <a:r>
               <a:rPr lang="zh-CN" altLang="en-US" sz="1400" b="1" dirty="0"/>
-              <a:t>算法在实验中暴露的问题给出具体的防护方案。</a:t>
+              <a:t>在实验中暴露的问题给出具体的防护方案。</a:t>
             </a:r>
             <a:r>
               <a:rPr lang="zh-CN" altLang="en-US" sz="1400" dirty="0"/>
-              <a:t>比如可以针对 </a:t>
+              <a:t>比如</a:t>
+            </a:r>
+            <a:r>
+              <a:rPr lang="zh-CN" altLang="en-US" sz="1400" dirty="0" smtClean="0"/>
+              <a:t>可以</a:t>
+            </a:r>
+            <a:r>
+              <a:rPr lang="zh-CN" altLang="en-US" sz="1400" dirty="0"/>
+              <a:t>对</a:t>
+            </a:r>
+            <a:r>
+              <a:rPr lang="zh-CN" altLang="en-US" sz="1400" dirty="0" smtClean="0"/>
+              <a:t> </a:t>
             </a:r>
             <a:r>
               <a:rPr lang="en-US" altLang="zh-CN" sz="1400" dirty="0"/>
@@ -25693,6 +26811,13 @@
       <p:transition spd="slow"/>
     </mc:Fallback>
   </mc:AlternateContent>
+  <p:timing>
+    <p:tnLst>
+      <p:par>
+        <p:cTn id="1" dur="indefinite" restart="never" nodeType="tmRoot"/>
+      </p:par>
+    </p:tnLst>
+  </p:timing>
 </p:sld>
 </file>
 

</xml_diff>